<commit_message>
update animation for special and add special banner
</commit_message>
<xml_diff>
--- a/Demo_v1.pptx
+++ b/Demo_v1.pptx
@@ -4048,6 +4048,81 @@
           </a:prstGeom>
         </p:spPr>
       </p:pic>
+      <p:sp>
+        <p:nvSpPr>
+          <p:cNvPr id="22" name="Rectangle: Single Corner Rounded 21">
+            <a:extLst>
+              <a:ext uri="{FF2B5EF4-FFF2-40B4-BE49-F238E27FC236}">
+                <a16:creationId xmlns:a16="http://schemas.microsoft.com/office/drawing/2014/main" id="{3DB48BE6-0DCF-4D87-8795-2FD16FB38EA5}"/>
+              </a:ext>
+            </a:extLst>
+          </p:cNvPr>
+          <p:cNvSpPr/>
+          <p:nvPr/>
+        </p:nvSpPr>
+        <p:spPr>
+          <a:xfrm>
+            <a:off x="24897" y="76197"/>
+            <a:ext cx="4724399" cy="609601"/>
+          </a:xfrm>
+          <a:prstGeom prst="round1Rect">
+            <a:avLst/>
+          </a:prstGeom>
+          <a:solidFill>
+            <a:schemeClr val="accent4"/>
+          </a:solidFill>
+          <a:effectLst>
+            <a:outerShdw blurRad="50800" dist="50800" dir="1800000" algn="l" rotWithShape="0">
+              <a:prstClr val="black">
+                <a:alpha val="40000"/>
+              </a:prstClr>
+            </a:outerShdw>
+            <a:softEdge rad="0"/>
+          </a:effectLst>
+          <a:scene3d>
+            <a:camera prst="orthographicFront"/>
+            <a:lightRig rig="threePt" dir="t"/>
+          </a:scene3d>
+          <a:sp3d>
+            <a:bevelT/>
+          </a:sp3d>
+        </p:spPr>
+        <p:style>
+          <a:lnRef idx="2">
+            <a:schemeClr val="accent4">
+              <a:shade val="50000"/>
+            </a:schemeClr>
+          </a:lnRef>
+          <a:fillRef idx="1">
+            <a:schemeClr val="accent4"/>
+          </a:fillRef>
+          <a:effectRef idx="0">
+            <a:schemeClr val="accent4"/>
+          </a:effectRef>
+          <a:fontRef idx="minor">
+            <a:schemeClr val="lt1"/>
+          </a:fontRef>
+        </p:style>
+        <p:txBody>
+          <a:bodyPr rtlCol="0" anchor="ctr"/>
+          <a:lstStyle/>
+          <a:p>
+            <a:pPr algn="ctr"/>
+            <a:r>
+              <a:rPr lang="en-US" sz="2800" dirty="0"/>
+              <a:t>SPECIAL</a:t>
+            </a:r>
+            <a:r>
+              <a:rPr lang="en-US" dirty="0"/>
+              <a:t> </a:t>
+            </a:r>
+            <a:r>
+              <a:rPr lang="en-US" sz="2000" dirty="0"/>
+              <a:t>OF THE DAY</a:t>
+            </a:r>
+          </a:p>
+        </p:txBody>
+      </p:sp>
     </p:spTree>
     <p:extLst>
       <p:ext uri="{BB962C8B-B14F-4D97-AF65-F5344CB8AC3E}">
@@ -4168,7 +4243,7 @@
                                 </p:stCondLst>
                                 <p:childTnLst>
                                   <p:par>
-                                    <p:cTn id="11" presetID="45" presetClass="entr" presetSubtype="0" fill="hold" nodeType="afterEffect">
+                                    <p:cTn id="11" presetID="45" presetClass="entr" presetSubtype="0" fill="hold" nodeType="clickEffect">
                                       <p:stCondLst>
                                         <p:cond delay="0"/>
                                       </p:stCondLst>
@@ -4353,12 +4428,12 @@
                                   <p:par>
                                     <p:cTn id="24" presetID="31" presetClass="exit" presetSubtype="0" fill="remove" nodeType="afterEffect">
                                       <p:stCondLst>
-                                        <p:cond delay="30000"/>
+                                        <p:cond delay="29000"/>
                                       </p:stCondLst>
                                       <p:childTnLst>
                                         <p:anim calcmode="lin" valueType="num">
                                           <p:cBhvr>
-                                            <p:cTn id="25" dur="1000"/>
+                                            <p:cTn id="25" dur="2000"/>
                                             <p:tgtEl>
                                               <p:spTgt spid="9"/>
                                             </p:tgtEl>
@@ -4381,7 +4456,7 @@
                                         </p:anim>
                                         <p:anim calcmode="lin" valueType="num">
                                           <p:cBhvr>
-                                            <p:cTn id="26" dur="1000"/>
+                                            <p:cTn id="26" dur="2000"/>
                                             <p:tgtEl>
                                               <p:spTgt spid="9"/>
                                             </p:tgtEl>
@@ -4404,7 +4479,7 @@
                                         </p:anim>
                                         <p:anim calcmode="lin" valueType="num">
                                           <p:cBhvr>
-                                            <p:cTn id="27" dur="1000"/>
+                                            <p:cTn id="27" dur="2000"/>
                                             <p:tgtEl>
                                               <p:spTgt spid="9"/>
                                             </p:tgtEl>
@@ -4427,7 +4502,7 @@
                                         </p:anim>
                                         <p:animEffect transition="out" filter="fade">
                                           <p:cBhvr>
-                                            <p:cTn id="28" dur="1000"/>
+                                            <p:cTn id="28" dur="2000"/>
                                             <p:tgtEl>
                                               <p:spTgt spid="9"/>
                                             </p:tgtEl>
@@ -4437,7 +4512,7 @@
                                           <p:cBhvr>
                                             <p:cTn id="29" dur="1" fill="hold">
                                               <p:stCondLst>
-                                                <p:cond delay="999"/>
+                                                <p:cond delay="1999"/>
                                               </p:stCondLst>
                                             </p:cTn>
                                             <p:tgtEl>

</xml_diff>